<commit_message>
add rotation to billboard
</commit_message>
<xml_diff>
--- a/Witch Ball mind map.pptx
+++ b/Witch Ball mind map.pptx
@@ -5,7 +5,7 @@
     <p:sldMasterId id="2147483648" r:id="rId1"/>
   </p:sldMasterIdLst>
   <p:notesMasterIdLst>
-    <p:notesMasterId r:id="rId15"/>
+    <p:notesMasterId r:id="rId16"/>
   </p:notesMasterIdLst>
   <p:sldIdLst>
     <p:sldId id="256" r:id="rId2"/>
@@ -21,6 +21,7 @@
     <p:sldId id="266" r:id="rId12"/>
     <p:sldId id="267" r:id="rId13"/>
     <p:sldId id="268" r:id="rId14"/>
+    <p:sldId id="269" r:id="rId15"/>
   </p:sldIdLst>
   <p:sldSz cx="12192000" cy="6858000"/>
   <p:notesSz cx="6858000" cy="9144000"/>
@@ -209,7 +210,7 @@
           <a:p>
             <a:fld id="{432EB83A-2125-4C75-8665-EE86B460C6D7}" type="datetimeFigureOut">
               <a:rPr lang="en-US" smtClean="0"/>
-              <a:t>7/18/2019</a:t>
+              <a:t>8/7/2019</a:t>
             </a:fld>
             <a:endParaRPr lang="en-US"/>
           </a:p>
@@ -1284,7 +1285,7 @@
           <a:p>
             <a:fld id="{2379F4E2-D73C-4C40-A6C8-9D172A2712F9}" type="datetimeFigureOut">
               <a:rPr lang="en-US" smtClean="0"/>
-              <a:t>7/18/2019</a:t>
+              <a:t>8/7/2019</a:t>
             </a:fld>
             <a:endParaRPr lang="en-US"/>
           </a:p>
@@ -1454,7 +1455,7 @@
           <a:p>
             <a:fld id="{2379F4E2-D73C-4C40-A6C8-9D172A2712F9}" type="datetimeFigureOut">
               <a:rPr lang="en-US" smtClean="0"/>
-              <a:t>7/18/2019</a:t>
+              <a:t>8/7/2019</a:t>
             </a:fld>
             <a:endParaRPr lang="en-US"/>
           </a:p>
@@ -1634,7 +1635,7 @@
           <a:p>
             <a:fld id="{2379F4E2-D73C-4C40-A6C8-9D172A2712F9}" type="datetimeFigureOut">
               <a:rPr lang="en-US" smtClean="0"/>
-              <a:t>7/18/2019</a:t>
+              <a:t>8/7/2019</a:t>
             </a:fld>
             <a:endParaRPr lang="en-US"/>
           </a:p>
@@ -1804,7 +1805,7 @@
           <a:p>
             <a:fld id="{2379F4E2-D73C-4C40-A6C8-9D172A2712F9}" type="datetimeFigureOut">
               <a:rPr lang="en-US" smtClean="0"/>
-              <a:t>7/18/2019</a:t>
+              <a:t>8/7/2019</a:t>
             </a:fld>
             <a:endParaRPr lang="en-US"/>
           </a:p>
@@ -2050,7 +2051,7 @@
           <a:p>
             <a:fld id="{2379F4E2-D73C-4C40-A6C8-9D172A2712F9}" type="datetimeFigureOut">
               <a:rPr lang="en-US" smtClean="0"/>
-              <a:t>7/18/2019</a:t>
+              <a:t>8/7/2019</a:t>
             </a:fld>
             <a:endParaRPr lang="en-US"/>
           </a:p>
@@ -2282,7 +2283,7 @@
           <a:p>
             <a:fld id="{2379F4E2-D73C-4C40-A6C8-9D172A2712F9}" type="datetimeFigureOut">
               <a:rPr lang="en-US" smtClean="0"/>
-              <a:t>7/18/2019</a:t>
+              <a:t>8/7/2019</a:t>
             </a:fld>
             <a:endParaRPr lang="en-US"/>
           </a:p>
@@ -2649,7 +2650,7 @@
           <a:p>
             <a:fld id="{2379F4E2-D73C-4C40-A6C8-9D172A2712F9}" type="datetimeFigureOut">
               <a:rPr lang="en-US" smtClean="0"/>
-              <a:t>7/18/2019</a:t>
+              <a:t>8/7/2019</a:t>
             </a:fld>
             <a:endParaRPr lang="en-US"/>
           </a:p>
@@ -2767,7 +2768,7 @@
           <a:p>
             <a:fld id="{2379F4E2-D73C-4C40-A6C8-9D172A2712F9}" type="datetimeFigureOut">
               <a:rPr lang="en-US" smtClean="0"/>
-              <a:t>7/18/2019</a:t>
+              <a:t>8/7/2019</a:t>
             </a:fld>
             <a:endParaRPr lang="en-US"/>
           </a:p>
@@ -2862,7 +2863,7 @@
           <a:p>
             <a:fld id="{2379F4E2-D73C-4C40-A6C8-9D172A2712F9}" type="datetimeFigureOut">
               <a:rPr lang="en-US" smtClean="0"/>
-              <a:t>7/18/2019</a:t>
+              <a:t>8/7/2019</a:t>
             </a:fld>
             <a:endParaRPr lang="en-US"/>
           </a:p>
@@ -3139,7 +3140,7 @@
           <a:p>
             <a:fld id="{2379F4E2-D73C-4C40-A6C8-9D172A2712F9}" type="datetimeFigureOut">
               <a:rPr lang="en-US" smtClean="0"/>
-              <a:t>7/18/2019</a:t>
+              <a:t>8/7/2019</a:t>
             </a:fld>
             <a:endParaRPr lang="en-US"/>
           </a:p>
@@ -3392,7 +3393,7 @@
           <a:p>
             <a:fld id="{2379F4E2-D73C-4C40-A6C8-9D172A2712F9}" type="datetimeFigureOut">
               <a:rPr lang="en-US" smtClean="0"/>
-              <a:t>7/18/2019</a:t>
+              <a:t>8/7/2019</a:t>
             </a:fld>
             <a:endParaRPr lang="en-US"/>
           </a:p>
@@ -3605,7 +3606,7 @@
           <a:p>
             <a:fld id="{2379F4E2-D73C-4C40-A6C8-9D172A2712F9}" type="datetimeFigureOut">
               <a:rPr lang="en-US" smtClean="0"/>
-              <a:t>7/18/2019</a:t>
+              <a:t>8/7/2019</a:t>
             </a:fld>
             <a:endParaRPr lang="en-US"/>
           </a:p>
@@ -9915,6 +9916,102 @@
 </p:sld>
 </file>
 
+<file path=ppt/slides/slide14.xml><?xml version="1.0" encoding="utf-8"?>
+<p:sld xmlns:a="http://schemas.openxmlformats.org/drawingml/2006/main" xmlns:r="http://schemas.openxmlformats.org/officeDocument/2006/relationships" xmlns:p="http://schemas.openxmlformats.org/presentationml/2006/main">
+  <p:cSld>
+    <p:spTree>
+      <p:nvGrpSpPr>
+        <p:cNvPr id="1" name=""/>
+        <p:cNvGrpSpPr/>
+        <p:nvPr/>
+      </p:nvGrpSpPr>
+      <p:grpSpPr>
+        <a:xfrm>
+          <a:off x="0" y="0"/>
+          <a:ext cx="0" cy="0"/>
+          <a:chOff x="0" y="0"/>
+          <a:chExt cx="0" cy="0"/>
+        </a:xfrm>
+      </p:grpSpPr>
+      <p:sp>
+        <p:nvSpPr>
+          <p:cNvPr id="2" name="Title 1"/>
+          <p:cNvSpPr>
+            <a:spLocks noGrp="1"/>
+          </p:cNvSpPr>
+          <p:nvPr>
+            <p:ph type="title"/>
+          </p:nvPr>
+        </p:nvSpPr>
+        <p:spPr/>
+        <p:txBody>
+          <a:bodyPr/>
+          <a:lstStyle/>
+          <a:p>
+            <a:r>
+              <a:rPr lang="en-US" dirty="0" smtClean="0"/>
+              <a:t>Animation FX</a:t>
+            </a:r>
+            <a:endParaRPr lang="en-US" dirty="0"/>
+          </a:p>
+        </p:txBody>
+      </p:sp>
+      <p:sp>
+        <p:nvSpPr>
+          <p:cNvPr id="3" name="Content Placeholder 2"/>
+          <p:cNvSpPr>
+            <a:spLocks noGrp="1"/>
+          </p:cNvSpPr>
+          <p:nvPr>
+            <p:ph idx="1"/>
+          </p:nvPr>
+        </p:nvSpPr>
+        <p:spPr/>
+        <p:txBody>
+          <a:bodyPr/>
+          <a:lstStyle/>
+          <a:p>
+            <a:r>
+              <a:rPr lang="en-US" dirty="0" smtClean="0"/>
+              <a:t>Character</a:t>
+            </a:r>
+          </a:p>
+          <a:p>
+            <a:r>
+              <a:rPr lang="en-US" dirty="0" smtClean="0"/>
+              <a:t>Ball</a:t>
+            </a:r>
+          </a:p>
+          <a:p>
+            <a:r>
+              <a:rPr lang="en-US" dirty="0" smtClean="0"/>
+              <a:t>Tile</a:t>
+            </a:r>
+          </a:p>
+          <a:p>
+            <a:r>
+              <a:rPr lang="en-US" dirty="0" smtClean="0"/>
+              <a:t>Weather</a:t>
+            </a:r>
+          </a:p>
+          <a:p>
+            <a:endParaRPr lang="en-US" dirty="0"/>
+          </a:p>
+        </p:txBody>
+      </p:sp>
+    </p:spTree>
+    <p:extLst>
+      <p:ext uri="{BB962C8B-B14F-4D97-AF65-F5344CB8AC3E}">
+        <p14:creationId xmlns:p14="http://schemas.microsoft.com/office/powerpoint/2010/main" val="902257334"/>
+      </p:ext>
+    </p:extLst>
+  </p:cSld>
+  <p:clrMapOvr>
+    <a:masterClrMapping/>
+  </p:clrMapOvr>
+</p:sld>
+</file>
+
 <file path=ppt/slides/slide2.xml><?xml version="1.0" encoding="utf-8"?>
 <p:sld xmlns:a="http://schemas.openxmlformats.org/drawingml/2006/main" xmlns:r="http://schemas.openxmlformats.org/officeDocument/2006/relationships" xmlns:p="http://schemas.openxmlformats.org/presentationml/2006/main">
   <p:cSld>

</xml_diff>